<commit_message>
Correction Exercice 4, 6 et 7
</commit_message>
<xml_diff>
--- a/Presentation Architecture.pptx
+++ b/Presentation Architecture.pptx
@@ -118,7 +118,7 @@
 <file path=ppt/revisionInfo.xml><?xml version="1.0" encoding="utf-8"?>
 <p1510:revInfo xmlns:a="http://schemas.openxmlformats.org/drawingml/2006/main" xmlns:r="http://schemas.openxmlformats.org/officeDocument/2006/relationships" xmlns:p1510="http://schemas.microsoft.com/office/powerpoint/2015/10/main">
   <p1510:revLst>
-    <p1510:client id="{58CB1665-4FCC-4438-8177-DCEA4F5BB405}" v="74" dt="2025-01-16T15:05:14.014"/>
+    <p1510:client id="{58CB1665-4FCC-4438-8177-DCEA4F5BB405}" v="75" dt="2025-01-16T16:03:59.517"/>
   </p1510:revLst>
 </p1510:revInfo>
 </file>
@@ -128,7 +128,7 @@
   <pc:docChgLst>
     <pc:chgData name="Sébastian RAMOS IZQUIERDO" userId="87098416-b306-4e36-9c97-b6e1b7b88e10" providerId="ADAL" clId="{58CB1665-4FCC-4438-8177-DCEA4F5BB405}"/>
     <pc:docChg chg="undo custSel addSld delSld modSld">
-      <pc:chgData name="Sébastian RAMOS IZQUIERDO" userId="87098416-b306-4e36-9c97-b6e1b7b88e10" providerId="ADAL" clId="{58CB1665-4FCC-4438-8177-DCEA4F5BB405}" dt="2025-01-16T15:31:28.548" v="3612" actId="20577"/>
+      <pc:chgData name="Sébastian RAMOS IZQUIERDO" userId="87098416-b306-4e36-9c97-b6e1b7b88e10" providerId="ADAL" clId="{58CB1665-4FCC-4438-8177-DCEA4F5BB405}" dt="2025-01-20T10:46:44.523" v="3652" actId="6549"/>
       <pc:docMkLst>
         <pc:docMk/>
       </pc:docMkLst>
@@ -472,7 +472,7 @@
         </pc:sldMkLst>
       </pc:sldChg>
       <pc:sldChg chg="modSp new mod">
-        <pc:chgData name="Sébastian RAMOS IZQUIERDO" userId="87098416-b306-4e36-9c97-b6e1b7b88e10" providerId="ADAL" clId="{58CB1665-4FCC-4438-8177-DCEA4F5BB405}" dt="2025-01-16T15:31:28.548" v="3612" actId="20577"/>
+        <pc:chgData name="Sébastian RAMOS IZQUIERDO" userId="87098416-b306-4e36-9c97-b6e1b7b88e10" providerId="ADAL" clId="{58CB1665-4FCC-4438-8177-DCEA4F5BB405}" dt="2025-01-20T10:46:44.523" v="3652" actId="6549"/>
         <pc:sldMkLst>
           <pc:docMk/>
           <pc:sldMk cId="905712263" sldId="260"/>
@@ -486,7 +486,7 @@
           </ac:spMkLst>
         </pc:spChg>
         <pc:spChg chg="mod">
-          <ac:chgData name="Sébastian RAMOS IZQUIERDO" userId="87098416-b306-4e36-9c97-b6e1b7b88e10" providerId="ADAL" clId="{58CB1665-4FCC-4438-8177-DCEA4F5BB405}" dt="2025-01-16T15:31:28.548" v="3612" actId="20577"/>
+          <ac:chgData name="Sébastian RAMOS IZQUIERDO" userId="87098416-b306-4e36-9c97-b6e1b7b88e10" providerId="ADAL" clId="{58CB1665-4FCC-4438-8177-DCEA4F5BB405}" dt="2025-01-20T10:46:44.523" v="3652" actId="6549"/>
           <ac:spMkLst>
             <pc:docMk/>
             <pc:sldMk cId="905712263" sldId="260"/>
@@ -646,7 +646,7 @@
           <a:p>
             <a:fld id="{7F5D8D41-180F-45F5-8B47-D9A911D0A24A}" type="datetimeFigureOut">
               <a:rPr lang="fr-FR" smtClean="0"/>
-              <a:t>16/01/2025</a:t>
+              <a:t>20/01/2025</a:t>
             </a:fld>
             <a:endParaRPr lang="fr-FR"/>
           </a:p>
@@ -844,7 +844,7 @@
           <a:p>
             <a:fld id="{7F5D8D41-180F-45F5-8B47-D9A911D0A24A}" type="datetimeFigureOut">
               <a:rPr lang="fr-FR" smtClean="0"/>
-              <a:t>16/01/2025</a:t>
+              <a:t>20/01/2025</a:t>
             </a:fld>
             <a:endParaRPr lang="fr-FR"/>
           </a:p>
@@ -1052,7 +1052,7 @@
           <a:p>
             <a:fld id="{7F5D8D41-180F-45F5-8B47-D9A911D0A24A}" type="datetimeFigureOut">
               <a:rPr lang="fr-FR" smtClean="0"/>
-              <a:t>16/01/2025</a:t>
+              <a:t>20/01/2025</a:t>
             </a:fld>
             <a:endParaRPr lang="fr-FR"/>
           </a:p>
@@ -1250,7 +1250,7 @@
           <a:p>
             <a:fld id="{7F5D8D41-180F-45F5-8B47-D9A911D0A24A}" type="datetimeFigureOut">
               <a:rPr lang="fr-FR" smtClean="0"/>
-              <a:t>16/01/2025</a:t>
+              <a:t>20/01/2025</a:t>
             </a:fld>
             <a:endParaRPr lang="fr-FR"/>
           </a:p>
@@ -1525,7 +1525,7 @@
           <a:p>
             <a:fld id="{7F5D8D41-180F-45F5-8B47-D9A911D0A24A}" type="datetimeFigureOut">
               <a:rPr lang="fr-FR" smtClean="0"/>
-              <a:t>16/01/2025</a:t>
+              <a:t>20/01/2025</a:t>
             </a:fld>
             <a:endParaRPr lang="fr-FR"/>
           </a:p>
@@ -1790,7 +1790,7 @@
           <a:p>
             <a:fld id="{7F5D8D41-180F-45F5-8B47-D9A911D0A24A}" type="datetimeFigureOut">
               <a:rPr lang="fr-FR" smtClean="0"/>
-              <a:t>16/01/2025</a:t>
+              <a:t>20/01/2025</a:t>
             </a:fld>
             <a:endParaRPr lang="fr-FR"/>
           </a:p>
@@ -2202,7 +2202,7 @@
           <a:p>
             <a:fld id="{7F5D8D41-180F-45F5-8B47-D9A911D0A24A}" type="datetimeFigureOut">
               <a:rPr lang="fr-FR" smtClean="0"/>
-              <a:t>16/01/2025</a:t>
+              <a:t>20/01/2025</a:t>
             </a:fld>
             <a:endParaRPr lang="fr-FR"/>
           </a:p>
@@ -2343,7 +2343,7 @@
           <a:p>
             <a:fld id="{7F5D8D41-180F-45F5-8B47-D9A911D0A24A}" type="datetimeFigureOut">
               <a:rPr lang="fr-FR" smtClean="0"/>
-              <a:t>16/01/2025</a:t>
+              <a:t>20/01/2025</a:t>
             </a:fld>
             <a:endParaRPr lang="fr-FR"/>
           </a:p>
@@ -2456,7 +2456,7 @@
           <a:p>
             <a:fld id="{7F5D8D41-180F-45F5-8B47-D9A911D0A24A}" type="datetimeFigureOut">
               <a:rPr lang="fr-FR" smtClean="0"/>
-              <a:t>16/01/2025</a:t>
+              <a:t>20/01/2025</a:t>
             </a:fld>
             <a:endParaRPr lang="fr-FR"/>
           </a:p>
@@ -2767,7 +2767,7 @@
           <a:p>
             <a:fld id="{7F5D8D41-180F-45F5-8B47-D9A911D0A24A}" type="datetimeFigureOut">
               <a:rPr lang="fr-FR" smtClean="0"/>
-              <a:t>16/01/2025</a:t>
+              <a:t>20/01/2025</a:t>
             </a:fld>
             <a:endParaRPr lang="fr-FR"/>
           </a:p>
@@ -3055,7 +3055,7 @@
           <a:p>
             <a:fld id="{7F5D8D41-180F-45F5-8B47-D9A911D0A24A}" type="datetimeFigureOut">
               <a:rPr lang="fr-FR" smtClean="0"/>
-              <a:t>16/01/2025</a:t>
+              <a:t>20/01/2025</a:t>
             </a:fld>
             <a:endParaRPr lang="fr-FR"/>
           </a:p>
@@ -3296,7 +3296,7 @@
           <a:p>
             <a:fld id="{7F5D8D41-180F-45F5-8B47-D9A911D0A24A}" type="datetimeFigureOut">
               <a:rPr lang="fr-FR" smtClean="0"/>
-              <a:t>16/01/2025</a:t>
+              <a:t>20/01/2025</a:t>
             </a:fld>
             <a:endParaRPr lang="fr-FR"/>
           </a:p>
@@ -5794,13 +5794,13 @@
         <p:spPr/>
         <p:txBody>
           <a:bodyPr>
-            <a:normAutofit fontScale="47500" lnSpcReduction="20000"/>
+            <a:normAutofit fontScale="55000" lnSpcReduction="20000"/>
           </a:bodyPr>
           <a:lstStyle/>
           <a:p>
             <a:r>
               <a:rPr lang="fr-FR" dirty="0"/>
-              <a:t>Si nécessaire demander les droits admin : </a:t>
+              <a:t>Demander les droits admin : </a:t>
             </a:r>
             <a:r>
               <a:rPr lang="fr-FR" dirty="0">
@@ -5841,44 +5841,51 @@
           <a:p>
             <a:r>
               <a:rPr lang="fr-FR" dirty="0"/>
-              <a:t>Se placer dans un répertoire où vous souhaitez stocker le projet puis le récupérer via la commande suivante : git clone </a:t>
+              <a:t>Installer Git : </a:t>
             </a:r>
             <a:r>
               <a:rPr lang="fr-FR" dirty="0">
                 <a:hlinkClick r:id="rId3"/>
               </a:rPr>
-              <a:t>https://github.com/Rezzas/onepoint_formation_rf_webui_selenium.git</a:t>
+              <a:t>https://git-scm.com/downloads</a:t>
             </a:r>
             <a:endParaRPr lang="fr-FR" dirty="0"/>
           </a:p>
           <a:p>
-            <a:endParaRPr lang="fr-FR" dirty="0"/>
-          </a:p>
-          <a:p>
             <a:r>
               <a:rPr lang="fr-FR" dirty="0"/>
-              <a:t>Installer Docker Desktop : </a:t>
+              <a:t>Se placer dans un répertoire où vous souhaitez stocker le projet puis le récupérer via la commande suivante : git clone </a:t>
             </a:r>
             <a:r>
               <a:rPr lang="fr-FR" dirty="0">
                 <a:hlinkClick r:id="rId4"/>
               </a:rPr>
-              <a:t>https://docs.docker.com/get-started/get-docker/</a:t>
+              <a:t>https://github.com/Rezzas/onepoint_formation_rf_webui_selenium.git</a:t>
             </a:r>
             <a:endParaRPr lang="fr-FR" dirty="0"/>
           </a:p>
           <a:p>
-            <a:endParaRPr lang="fr-FR" dirty="0"/>
-          </a:p>
-          <a:p>
             <a:r>
               <a:rPr lang="fr-FR" dirty="0"/>
-              <a:t>Installer VS Code : </a:t>
+              <a:t>Installer Docker Desktop : </a:t>
             </a:r>
             <a:r>
               <a:rPr lang="fr-FR" dirty="0">
                 <a:hlinkClick r:id="rId5"/>
               </a:rPr>
+              <a:t>https://docs.docker.com/get-started/get-docker/</a:t>
+            </a:r>
+            <a:endParaRPr lang="fr-FR" dirty="0"/>
+          </a:p>
+          <a:p>
+            <a:r>
+              <a:rPr lang="fr-FR" dirty="0"/>
+              <a:t>Installer VS Code : </a:t>
+            </a:r>
+            <a:r>
+              <a:rPr lang="fr-FR" dirty="0">
+                <a:hlinkClick r:id="rId6"/>
+              </a:rPr>
               <a:t>https://code.visualstudio.com/download</a:t>
             </a:r>
             <a:endParaRPr lang="fr-FR" dirty="0"/>
@@ -5934,7 +5941,7 @@
             </a:r>
             <a:r>
               <a:rPr lang="fr-FR" dirty="0">
-                <a:hlinkClick r:id="rId6"/>
+                <a:hlinkClick r:id="rId7"/>
               </a:rPr>
               <a:t>http://localhost:7900/?autoconnect=1&amp;resize=scale&amp;password=secret</a:t>
             </a:r>

</xml_diff>